<commit_message>
Edits to Paper 3
</commit_message>
<xml_diff>
--- a/table3_1.pptx
+++ b/table3_1.pptx
@@ -2,12 +2,12 @@
 <file path=ppt/presentation.xml><?xml version="1.0" encoding="utf-8"?>
 <p:presentation xmlns:a="http://schemas.openxmlformats.org/drawingml/2006/main" xmlns:r="http://schemas.openxmlformats.org/officeDocument/2006/relationships" xmlns:p="http://schemas.openxmlformats.org/presentationml/2006/main" saveSubsetFonts="1">
   <p:sldMasterIdLst>
-    <p:sldMasterId id="2147483708" r:id="rId1"/>
+    <p:sldMasterId id="2147483720" r:id="rId1"/>
   </p:sldMasterIdLst>
   <p:sldIdLst>
     <p:sldId id="256" r:id="rId2"/>
   </p:sldIdLst>
-  <p:sldSz cx="5943600" cy="5486400"/>
+  <p:sldSz cx="6858000" cy="5486400"/>
   <p:notesSz cx="6858000" cy="9144000"/>
   <p:defaultTextStyle>
     <a:defPPr>
@@ -141,15 +141,15 @@
         </p:nvSpPr>
         <p:spPr>
           <a:xfrm>
-            <a:off x="445770" y="897890"/>
-            <a:ext cx="5052060" cy="1910080"/>
+            <a:off x="514350" y="897890"/>
+            <a:ext cx="5829300" cy="1910080"/>
           </a:xfrm>
         </p:spPr>
         <p:txBody>
           <a:bodyPr anchor="b"/>
           <a:lstStyle>
             <a:lvl1pPr algn="ctr">
-              <a:defRPr sz="3900"/>
+              <a:defRPr sz="4500"/>
             </a:lvl1pPr>
           </a:lstStyle>
           <a:p>
@@ -173,8 +173,8 @@
         </p:nvSpPr>
         <p:spPr>
           <a:xfrm>
-            <a:off x="742950" y="2881630"/>
-            <a:ext cx="4457700" cy="1324610"/>
+            <a:off x="857250" y="2881630"/>
+            <a:ext cx="5143500" cy="1324610"/>
           </a:xfrm>
         </p:spPr>
         <p:txBody>
@@ -182,39 +182,39 @@
           <a:lstStyle>
             <a:lvl1pPr marL="0" indent="0" algn="ctr">
               <a:buNone/>
-              <a:defRPr sz="1560"/>
+              <a:defRPr sz="1800"/>
             </a:lvl1pPr>
-            <a:lvl2pPr marL="297180" indent="0" algn="ctr">
-              <a:buNone/>
-              <a:defRPr sz="1300"/>
+            <a:lvl2pPr marL="342900" indent="0" algn="ctr">
+              <a:buNone/>
+              <a:defRPr sz="1500"/>
             </a:lvl2pPr>
-            <a:lvl3pPr marL="594360" indent="0" algn="ctr">
-              <a:buNone/>
-              <a:defRPr sz="1170"/>
+            <a:lvl3pPr marL="685800" indent="0" algn="ctr">
+              <a:buNone/>
+              <a:defRPr sz="1350"/>
             </a:lvl3pPr>
-            <a:lvl4pPr marL="891540" indent="0" algn="ctr">
-              <a:buNone/>
-              <a:defRPr sz="1040"/>
+            <a:lvl4pPr marL="1028700" indent="0" algn="ctr">
+              <a:buNone/>
+              <a:defRPr sz="1200"/>
             </a:lvl4pPr>
-            <a:lvl5pPr marL="1188720" indent="0" algn="ctr">
-              <a:buNone/>
-              <a:defRPr sz="1040"/>
+            <a:lvl5pPr marL="1371600" indent="0" algn="ctr">
+              <a:buNone/>
+              <a:defRPr sz="1200"/>
             </a:lvl5pPr>
-            <a:lvl6pPr marL="1485900" indent="0" algn="ctr">
-              <a:buNone/>
-              <a:defRPr sz="1040"/>
+            <a:lvl6pPr marL="1714500" indent="0" algn="ctr">
+              <a:buNone/>
+              <a:defRPr sz="1200"/>
             </a:lvl6pPr>
-            <a:lvl7pPr marL="1783080" indent="0" algn="ctr">
-              <a:buNone/>
-              <a:defRPr sz="1040"/>
+            <a:lvl7pPr marL="2057400" indent="0" algn="ctr">
+              <a:buNone/>
+              <a:defRPr sz="1200"/>
             </a:lvl7pPr>
-            <a:lvl8pPr marL="2080260" indent="0" algn="ctr">
-              <a:buNone/>
-              <a:defRPr sz="1040"/>
+            <a:lvl8pPr marL="2400300" indent="0" algn="ctr">
+              <a:buNone/>
+              <a:defRPr sz="1200"/>
             </a:lvl8pPr>
-            <a:lvl9pPr marL="2377440" indent="0" algn="ctr">
-              <a:buNone/>
-              <a:defRPr sz="1040"/>
+            <a:lvl9pPr marL="2743200" indent="0" algn="ctr">
+              <a:buNone/>
+              <a:defRPr sz="1200"/>
             </a:lvl9pPr>
           </a:lstStyle>
           <a:p>
@@ -243,7 +243,7 @@
           <a:p>
             <a:fld id="{4EA1F6FD-E570-49E4-ADDB-683FCB8AA891}" type="datetimeFigureOut">
               <a:rPr lang="en-US" smtClean="0"/>
-              <a:t>2/16/2023</a:t>
+              <a:t>2/23/2023</a:t>
             </a:fld>
             <a:endParaRPr lang="en-US"/>
           </a:p>
@@ -294,7 +294,7 @@
     </p:spTree>
     <p:extLst>
       <p:ext uri="{BB962C8B-B14F-4D97-AF65-F5344CB8AC3E}">
-        <p14:creationId xmlns:p14="http://schemas.microsoft.com/office/powerpoint/2010/main" val="4141054469"/>
+        <p14:creationId xmlns:p14="http://schemas.microsoft.com/office/powerpoint/2010/main" val="4118562674"/>
       </p:ext>
     </p:extLst>
   </p:cSld>
@@ -413,7 +413,7 @@
           <a:p>
             <a:fld id="{4EA1F6FD-E570-49E4-ADDB-683FCB8AA891}" type="datetimeFigureOut">
               <a:rPr lang="en-US" smtClean="0"/>
-              <a:t>2/16/2023</a:t>
+              <a:t>2/23/2023</a:t>
             </a:fld>
             <a:endParaRPr lang="en-US"/>
           </a:p>
@@ -464,7 +464,7 @@
     </p:spTree>
     <p:extLst>
       <p:ext uri="{BB962C8B-B14F-4D97-AF65-F5344CB8AC3E}">
-        <p14:creationId xmlns:p14="http://schemas.microsoft.com/office/powerpoint/2010/main" val="98502452"/>
+        <p14:creationId xmlns:p14="http://schemas.microsoft.com/office/powerpoint/2010/main" val="3661218667"/>
       </p:ext>
     </p:extLst>
   </p:cSld>
@@ -503,8 +503,8 @@
         </p:nvSpPr>
         <p:spPr>
           <a:xfrm>
-            <a:off x="4253389" y="292100"/>
-            <a:ext cx="1281589" cy="4649470"/>
+            <a:off x="4907757" y="292100"/>
+            <a:ext cx="1478756" cy="4649470"/>
           </a:xfrm>
         </p:spPr>
         <p:txBody>
@@ -531,8 +531,8 @@
         </p:nvSpPr>
         <p:spPr>
           <a:xfrm>
-            <a:off x="408623" y="292100"/>
-            <a:ext cx="3770471" cy="4649470"/>
+            <a:off x="471488" y="292100"/>
+            <a:ext cx="4350544" cy="4649470"/>
           </a:xfrm>
         </p:spPr>
         <p:txBody>
@@ -593,7 +593,7 @@
           <a:p>
             <a:fld id="{4EA1F6FD-E570-49E4-ADDB-683FCB8AA891}" type="datetimeFigureOut">
               <a:rPr lang="en-US" smtClean="0"/>
-              <a:t>2/16/2023</a:t>
+              <a:t>2/23/2023</a:t>
             </a:fld>
             <a:endParaRPr lang="en-US"/>
           </a:p>
@@ -644,7 +644,7 @@
     </p:spTree>
     <p:extLst>
       <p:ext uri="{BB962C8B-B14F-4D97-AF65-F5344CB8AC3E}">
-        <p14:creationId xmlns:p14="http://schemas.microsoft.com/office/powerpoint/2010/main" val="2820243019"/>
+        <p14:creationId xmlns:p14="http://schemas.microsoft.com/office/powerpoint/2010/main" val="514653721"/>
       </p:ext>
     </p:extLst>
   </p:cSld>
@@ -763,7 +763,7 @@
           <a:p>
             <a:fld id="{4EA1F6FD-E570-49E4-ADDB-683FCB8AA891}" type="datetimeFigureOut">
               <a:rPr lang="en-US" smtClean="0"/>
-              <a:t>2/16/2023</a:t>
+              <a:t>2/23/2023</a:t>
             </a:fld>
             <a:endParaRPr lang="en-US"/>
           </a:p>
@@ -814,7 +814,7 @@
     </p:spTree>
     <p:extLst>
       <p:ext uri="{BB962C8B-B14F-4D97-AF65-F5344CB8AC3E}">
-        <p14:creationId xmlns:p14="http://schemas.microsoft.com/office/powerpoint/2010/main" val="656774989"/>
+        <p14:creationId xmlns:p14="http://schemas.microsoft.com/office/powerpoint/2010/main" val="3689517232"/>
       </p:ext>
     </p:extLst>
   </p:cSld>
@@ -853,15 +853,15 @@
         </p:nvSpPr>
         <p:spPr>
           <a:xfrm>
-            <a:off x="405527" y="1367791"/>
-            <a:ext cx="5126355" cy="2282190"/>
+            <a:off x="467916" y="1367791"/>
+            <a:ext cx="5915025" cy="2282190"/>
           </a:xfrm>
         </p:spPr>
         <p:txBody>
           <a:bodyPr anchor="b"/>
           <a:lstStyle>
             <a:lvl1pPr>
-              <a:defRPr sz="3900"/>
+              <a:defRPr sz="4500"/>
             </a:lvl1pPr>
           </a:lstStyle>
           <a:p>
@@ -885,8 +885,8 @@
         </p:nvSpPr>
         <p:spPr>
           <a:xfrm>
-            <a:off x="405527" y="3671571"/>
-            <a:ext cx="5126355" cy="1200150"/>
+            <a:off x="467916" y="3671571"/>
+            <a:ext cx="5915025" cy="1200150"/>
           </a:xfrm>
         </p:spPr>
         <p:txBody>
@@ -894,15 +894,15 @@
           <a:lstStyle>
             <a:lvl1pPr marL="0" indent="0">
               <a:buNone/>
-              <a:defRPr sz="1560">
+              <a:defRPr sz="1800">
                 <a:solidFill>
                   <a:schemeClr val="tx1"/>
                 </a:solidFill>
               </a:defRPr>
             </a:lvl1pPr>
-            <a:lvl2pPr marL="297180" indent="0">
-              <a:buNone/>
-              <a:defRPr sz="1300">
+            <a:lvl2pPr marL="342900" indent="0">
+              <a:buNone/>
+              <a:defRPr sz="1500">
                 <a:solidFill>
                   <a:schemeClr val="tx1">
                     <a:tint val="75000"/>
@@ -910,9 +910,9 @@
                 </a:solidFill>
               </a:defRPr>
             </a:lvl2pPr>
-            <a:lvl3pPr marL="594360" indent="0">
-              <a:buNone/>
-              <a:defRPr sz="1170">
+            <a:lvl3pPr marL="685800" indent="0">
+              <a:buNone/>
+              <a:defRPr sz="1350">
                 <a:solidFill>
                   <a:schemeClr val="tx1">
                     <a:tint val="75000"/>
@@ -920,9 +920,9 @@
                 </a:solidFill>
               </a:defRPr>
             </a:lvl3pPr>
-            <a:lvl4pPr marL="891540" indent="0">
-              <a:buNone/>
-              <a:defRPr sz="1040">
+            <a:lvl4pPr marL="1028700" indent="0">
+              <a:buNone/>
+              <a:defRPr sz="1200">
                 <a:solidFill>
                   <a:schemeClr val="tx1">
                     <a:tint val="75000"/>
@@ -930,9 +930,9 @@
                 </a:solidFill>
               </a:defRPr>
             </a:lvl4pPr>
-            <a:lvl5pPr marL="1188720" indent="0">
-              <a:buNone/>
-              <a:defRPr sz="1040">
+            <a:lvl5pPr marL="1371600" indent="0">
+              <a:buNone/>
+              <a:defRPr sz="1200">
                 <a:solidFill>
                   <a:schemeClr val="tx1">
                     <a:tint val="75000"/>
@@ -940,9 +940,9 @@
                 </a:solidFill>
               </a:defRPr>
             </a:lvl5pPr>
-            <a:lvl6pPr marL="1485900" indent="0">
-              <a:buNone/>
-              <a:defRPr sz="1040">
+            <a:lvl6pPr marL="1714500" indent="0">
+              <a:buNone/>
+              <a:defRPr sz="1200">
                 <a:solidFill>
                   <a:schemeClr val="tx1">
                     <a:tint val="75000"/>
@@ -950,9 +950,9 @@
                 </a:solidFill>
               </a:defRPr>
             </a:lvl6pPr>
-            <a:lvl7pPr marL="1783080" indent="0">
-              <a:buNone/>
-              <a:defRPr sz="1040">
+            <a:lvl7pPr marL="2057400" indent="0">
+              <a:buNone/>
+              <a:defRPr sz="1200">
                 <a:solidFill>
                   <a:schemeClr val="tx1">
                     <a:tint val="75000"/>
@@ -960,9 +960,9 @@
                 </a:solidFill>
               </a:defRPr>
             </a:lvl7pPr>
-            <a:lvl8pPr marL="2080260" indent="0">
-              <a:buNone/>
-              <a:defRPr sz="1040">
+            <a:lvl8pPr marL="2400300" indent="0">
+              <a:buNone/>
+              <a:defRPr sz="1200">
                 <a:solidFill>
                   <a:schemeClr val="tx1">
                     <a:tint val="75000"/>
@@ -970,9 +970,9 @@
                 </a:solidFill>
               </a:defRPr>
             </a:lvl8pPr>
-            <a:lvl9pPr marL="2377440" indent="0">
-              <a:buNone/>
-              <a:defRPr sz="1040">
+            <a:lvl9pPr marL="2743200" indent="0">
+              <a:buNone/>
+              <a:defRPr sz="1200">
                 <a:solidFill>
                   <a:schemeClr val="tx1">
                     <a:tint val="75000"/>
@@ -1007,7 +1007,7 @@
           <a:p>
             <a:fld id="{4EA1F6FD-E570-49E4-ADDB-683FCB8AA891}" type="datetimeFigureOut">
               <a:rPr lang="en-US" smtClean="0"/>
-              <a:t>2/16/2023</a:t>
+              <a:t>2/23/2023</a:t>
             </a:fld>
             <a:endParaRPr lang="en-US"/>
           </a:p>
@@ -1058,7 +1058,7 @@
     </p:spTree>
     <p:extLst>
       <p:ext uri="{BB962C8B-B14F-4D97-AF65-F5344CB8AC3E}">
-        <p14:creationId xmlns:p14="http://schemas.microsoft.com/office/powerpoint/2010/main" val="2708178724"/>
+        <p14:creationId xmlns:p14="http://schemas.microsoft.com/office/powerpoint/2010/main" val="480982050"/>
       </p:ext>
     </p:extLst>
   </p:cSld>
@@ -1120,8 +1120,8 @@
         </p:nvSpPr>
         <p:spPr>
           <a:xfrm>
-            <a:off x="408623" y="1460500"/>
-            <a:ext cx="2526030" cy="3481070"/>
+            <a:off x="471488" y="1460500"/>
+            <a:ext cx="2914650" cy="3481070"/>
           </a:xfrm>
         </p:spPr>
         <p:txBody>
@@ -1177,8 +1177,8 @@
         </p:nvSpPr>
         <p:spPr>
           <a:xfrm>
-            <a:off x="3008948" y="1460500"/>
-            <a:ext cx="2526030" cy="3481070"/>
+            <a:off x="3471863" y="1460500"/>
+            <a:ext cx="2914650" cy="3481070"/>
           </a:xfrm>
         </p:spPr>
         <p:txBody>
@@ -1239,7 +1239,7 @@
           <a:p>
             <a:fld id="{4EA1F6FD-E570-49E4-ADDB-683FCB8AA891}" type="datetimeFigureOut">
               <a:rPr lang="en-US" smtClean="0"/>
-              <a:t>2/16/2023</a:t>
+              <a:t>2/23/2023</a:t>
             </a:fld>
             <a:endParaRPr lang="en-US"/>
           </a:p>
@@ -1290,7 +1290,7 @@
     </p:spTree>
     <p:extLst>
       <p:ext uri="{BB962C8B-B14F-4D97-AF65-F5344CB8AC3E}">
-        <p14:creationId xmlns:p14="http://schemas.microsoft.com/office/powerpoint/2010/main" val="2852714484"/>
+        <p14:creationId xmlns:p14="http://schemas.microsoft.com/office/powerpoint/2010/main" val="3079179239"/>
       </p:ext>
     </p:extLst>
   </p:cSld>
@@ -1329,8 +1329,8 @@
         </p:nvSpPr>
         <p:spPr>
           <a:xfrm>
-            <a:off x="409397" y="292101"/>
-            <a:ext cx="5126355" cy="1060450"/>
+            <a:off x="472381" y="292101"/>
+            <a:ext cx="5915025" cy="1060450"/>
           </a:xfrm>
         </p:spPr>
         <p:txBody>
@@ -1357,8 +1357,8 @@
         </p:nvSpPr>
         <p:spPr>
           <a:xfrm>
-            <a:off x="409397" y="1344930"/>
-            <a:ext cx="2514421" cy="659130"/>
+            <a:off x="472381" y="1344930"/>
+            <a:ext cx="2901255" cy="659130"/>
           </a:xfrm>
         </p:spPr>
         <p:txBody>
@@ -1366,39 +1366,39 @@
           <a:lstStyle>
             <a:lvl1pPr marL="0" indent="0">
               <a:buNone/>
-              <a:defRPr sz="1560" b="1"/>
+              <a:defRPr sz="1800" b="1"/>
             </a:lvl1pPr>
-            <a:lvl2pPr marL="297180" indent="0">
-              <a:buNone/>
-              <a:defRPr sz="1300" b="1"/>
+            <a:lvl2pPr marL="342900" indent="0">
+              <a:buNone/>
+              <a:defRPr sz="1500" b="1"/>
             </a:lvl2pPr>
-            <a:lvl3pPr marL="594360" indent="0">
-              <a:buNone/>
-              <a:defRPr sz="1170" b="1"/>
+            <a:lvl3pPr marL="685800" indent="0">
+              <a:buNone/>
+              <a:defRPr sz="1350" b="1"/>
             </a:lvl3pPr>
-            <a:lvl4pPr marL="891540" indent="0">
-              <a:buNone/>
-              <a:defRPr sz="1040" b="1"/>
+            <a:lvl4pPr marL="1028700" indent="0">
+              <a:buNone/>
+              <a:defRPr sz="1200" b="1"/>
             </a:lvl4pPr>
-            <a:lvl5pPr marL="1188720" indent="0">
-              <a:buNone/>
-              <a:defRPr sz="1040" b="1"/>
+            <a:lvl5pPr marL="1371600" indent="0">
+              <a:buNone/>
+              <a:defRPr sz="1200" b="1"/>
             </a:lvl5pPr>
-            <a:lvl6pPr marL="1485900" indent="0">
-              <a:buNone/>
-              <a:defRPr sz="1040" b="1"/>
+            <a:lvl6pPr marL="1714500" indent="0">
+              <a:buNone/>
+              <a:defRPr sz="1200" b="1"/>
             </a:lvl6pPr>
-            <a:lvl7pPr marL="1783080" indent="0">
-              <a:buNone/>
-              <a:defRPr sz="1040" b="1"/>
+            <a:lvl7pPr marL="2057400" indent="0">
+              <a:buNone/>
+              <a:defRPr sz="1200" b="1"/>
             </a:lvl7pPr>
-            <a:lvl8pPr marL="2080260" indent="0">
-              <a:buNone/>
-              <a:defRPr sz="1040" b="1"/>
+            <a:lvl8pPr marL="2400300" indent="0">
+              <a:buNone/>
+              <a:defRPr sz="1200" b="1"/>
             </a:lvl8pPr>
-            <a:lvl9pPr marL="2377440" indent="0">
-              <a:buNone/>
-              <a:defRPr sz="1040" b="1"/>
+            <a:lvl9pPr marL="2743200" indent="0">
+              <a:buNone/>
+              <a:defRPr sz="1200" b="1"/>
             </a:lvl9pPr>
           </a:lstStyle>
           <a:p>
@@ -1422,8 +1422,8 @@
         </p:nvSpPr>
         <p:spPr>
           <a:xfrm>
-            <a:off x="409397" y="2004060"/>
-            <a:ext cx="2514421" cy="2947670"/>
+            <a:off x="472381" y="2004060"/>
+            <a:ext cx="2901255" cy="2947670"/>
           </a:xfrm>
         </p:spPr>
         <p:txBody>
@@ -1479,8 +1479,8 @@
         </p:nvSpPr>
         <p:spPr>
           <a:xfrm>
-            <a:off x="3008948" y="1344930"/>
-            <a:ext cx="2526804" cy="659130"/>
+            <a:off x="3471863" y="1344930"/>
+            <a:ext cx="2915543" cy="659130"/>
           </a:xfrm>
         </p:spPr>
         <p:txBody>
@@ -1488,39 +1488,39 @@
           <a:lstStyle>
             <a:lvl1pPr marL="0" indent="0">
               <a:buNone/>
-              <a:defRPr sz="1560" b="1"/>
+              <a:defRPr sz="1800" b="1"/>
             </a:lvl1pPr>
-            <a:lvl2pPr marL="297180" indent="0">
-              <a:buNone/>
-              <a:defRPr sz="1300" b="1"/>
+            <a:lvl2pPr marL="342900" indent="0">
+              <a:buNone/>
+              <a:defRPr sz="1500" b="1"/>
             </a:lvl2pPr>
-            <a:lvl3pPr marL="594360" indent="0">
-              <a:buNone/>
-              <a:defRPr sz="1170" b="1"/>
+            <a:lvl3pPr marL="685800" indent="0">
+              <a:buNone/>
+              <a:defRPr sz="1350" b="1"/>
             </a:lvl3pPr>
-            <a:lvl4pPr marL="891540" indent="0">
-              <a:buNone/>
-              <a:defRPr sz="1040" b="1"/>
+            <a:lvl4pPr marL="1028700" indent="0">
+              <a:buNone/>
+              <a:defRPr sz="1200" b="1"/>
             </a:lvl4pPr>
-            <a:lvl5pPr marL="1188720" indent="0">
-              <a:buNone/>
-              <a:defRPr sz="1040" b="1"/>
+            <a:lvl5pPr marL="1371600" indent="0">
+              <a:buNone/>
+              <a:defRPr sz="1200" b="1"/>
             </a:lvl5pPr>
-            <a:lvl6pPr marL="1485900" indent="0">
-              <a:buNone/>
-              <a:defRPr sz="1040" b="1"/>
+            <a:lvl6pPr marL="1714500" indent="0">
+              <a:buNone/>
+              <a:defRPr sz="1200" b="1"/>
             </a:lvl6pPr>
-            <a:lvl7pPr marL="1783080" indent="0">
-              <a:buNone/>
-              <a:defRPr sz="1040" b="1"/>
+            <a:lvl7pPr marL="2057400" indent="0">
+              <a:buNone/>
+              <a:defRPr sz="1200" b="1"/>
             </a:lvl7pPr>
-            <a:lvl8pPr marL="2080260" indent="0">
-              <a:buNone/>
-              <a:defRPr sz="1040" b="1"/>
+            <a:lvl8pPr marL="2400300" indent="0">
+              <a:buNone/>
+              <a:defRPr sz="1200" b="1"/>
             </a:lvl8pPr>
-            <a:lvl9pPr marL="2377440" indent="0">
-              <a:buNone/>
-              <a:defRPr sz="1040" b="1"/>
+            <a:lvl9pPr marL="2743200" indent="0">
+              <a:buNone/>
+              <a:defRPr sz="1200" b="1"/>
             </a:lvl9pPr>
           </a:lstStyle>
           <a:p>
@@ -1544,8 +1544,8 @@
         </p:nvSpPr>
         <p:spPr>
           <a:xfrm>
-            <a:off x="3008948" y="2004060"/>
-            <a:ext cx="2526804" cy="2947670"/>
+            <a:off x="3471863" y="2004060"/>
+            <a:ext cx="2915543" cy="2947670"/>
           </a:xfrm>
         </p:spPr>
         <p:txBody>
@@ -1606,7 +1606,7 @@
           <a:p>
             <a:fld id="{4EA1F6FD-E570-49E4-ADDB-683FCB8AA891}" type="datetimeFigureOut">
               <a:rPr lang="en-US" smtClean="0"/>
-              <a:t>2/16/2023</a:t>
+              <a:t>2/23/2023</a:t>
             </a:fld>
             <a:endParaRPr lang="en-US"/>
           </a:p>
@@ -1657,7 +1657,7 @@
     </p:spTree>
     <p:extLst>
       <p:ext uri="{BB962C8B-B14F-4D97-AF65-F5344CB8AC3E}">
-        <p14:creationId xmlns:p14="http://schemas.microsoft.com/office/powerpoint/2010/main" val="745978412"/>
+        <p14:creationId xmlns:p14="http://schemas.microsoft.com/office/powerpoint/2010/main" val="2068989710"/>
       </p:ext>
     </p:extLst>
   </p:cSld>
@@ -1724,7 +1724,7 @@
           <a:p>
             <a:fld id="{4EA1F6FD-E570-49E4-ADDB-683FCB8AA891}" type="datetimeFigureOut">
               <a:rPr lang="en-US" smtClean="0"/>
-              <a:t>2/16/2023</a:t>
+              <a:t>2/23/2023</a:t>
             </a:fld>
             <a:endParaRPr lang="en-US"/>
           </a:p>
@@ -1775,7 +1775,7 @@
     </p:spTree>
     <p:extLst>
       <p:ext uri="{BB962C8B-B14F-4D97-AF65-F5344CB8AC3E}">
-        <p14:creationId xmlns:p14="http://schemas.microsoft.com/office/powerpoint/2010/main" val="2582026943"/>
+        <p14:creationId xmlns:p14="http://schemas.microsoft.com/office/powerpoint/2010/main" val="2345694860"/>
       </p:ext>
     </p:extLst>
   </p:cSld>
@@ -1819,7 +1819,7 @@
           <a:p>
             <a:fld id="{4EA1F6FD-E570-49E4-ADDB-683FCB8AA891}" type="datetimeFigureOut">
               <a:rPr lang="en-US" smtClean="0"/>
-              <a:t>2/16/2023</a:t>
+              <a:t>2/23/2023</a:t>
             </a:fld>
             <a:endParaRPr lang="en-US"/>
           </a:p>
@@ -1870,7 +1870,7 @@
     </p:spTree>
     <p:extLst>
       <p:ext uri="{BB962C8B-B14F-4D97-AF65-F5344CB8AC3E}">
-        <p14:creationId xmlns:p14="http://schemas.microsoft.com/office/powerpoint/2010/main" val="2092957211"/>
+        <p14:creationId xmlns:p14="http://schemas.microsoft.com/office/powerpoint/2010/main" val="1943958028"/>
       </p:ext>
     </p:extLst>
   </p:cSld>
@@ -1909,15 +1909,15 @@
         </p:nvSpPr>
         <p:spPr>
           <a:xfrm>
-            <a:off x="409397" y="365760"/>
-            <a:ext cx="1916966" cy="1280160"/>
+            <a:off x="472381" y="365760"/>
+            <a:ext cx="2211884" cy="1280160"/>
           </a:xfrm>
         </p:spPr>
         <p:txBody>
           <a:bodyPr anchor="b"/>
           <a:lstStyle>
             <a:lvl1pPr>
-              <a:defRPr sz="2080"/>
+              <a:defRPr sz="2400"/>
             </a:lvl1pPr>
           </a:lstStyle>
           <a:p>
@@ -1941,39 +1941,39 @@
         </p:nvSpPr>
         <p:spPr>
           <a:xfrm>
-            <a:off x="2526804" y="789941"/>
-            <a:ext cx="3008948" cy="3898900"/>
+            <a:off x="2915543" y="789941"/>
+            <a:ext cx="3471863" cy="3898900"/>
           </a:xfrm>
         </p:spPr>
         <p:txBody>
           <a:bodyPr/>
           <a:lstStyle>
             <a:lvl1pPr>
-              <a:defRPr sz="2080"/>
+              <a:defRPr sz="2400"/>
             </a:lvl1pPr>
             <a:lvl2pPr>
-              <a:defRPr sz="1820"/>
+              <a:defRPr sz="2100"/>
             </a:lvl2pPr>
             <a:lvl3pPr>
-              <a:defRPr sz="1560"/>
+              <a:defRPr sz="1800"/>
             </a:lvl3pPr>
             <a:lvl4pPr>
-              <a:defRPr sz="1300"/>
+              <a:defRPr sz="1500"/>
             </a:lvl4pPr>
             <a:lvl5pPr>
-              <a:defRPr sz="1300"/>
+              <a:defRPr sz="1500"/>
             </a:lvl5pPr>
             <a:lvl6pPr>
-              <a:defRPr sz="1300"/>
+              <a:defRPr sz="1500"/>
             </a:lvl6pPr>
             <a:lvl7pPr>
-              <a:defRPr sz="1300"/>
+              <a:defRPr sz="1500"/>
             </a:lvl7pPr>
             <a:lvl8pPr>
-              <a:defRPr sz="1300"/>
+              <a:defRPr sz="1500"/>
             </a:lvl8pPr>
             <a:lvl9pPr>
-              <a:defRPr sz="1300"/>
+              <a:defRPr sz="1500"/>
             </a:lvl9pPr>
           </a:lstStyle>
           <a:p>
@@ -2026,8 +2026,8 @@
         </p:nvSpPr>
         <p:spPr>
           <a:xfrm>
-            <a:off x="409397" y="1645920"/>
-            <a:ext cx="1916966" cy="3049270"/>
+            <a:off x="472381" y="1645920"/>
+            <a:ext cx="2211884" cy="3049270"/>
           </a:xfrm>
         </p:spPr>
         <p:txBody>
@@ -2035,39 +2035,39 @@
           <a:lstStyle>
             <a:lvl1pPr marL="0" indent="0">
               <a:buNone/>
-              <a:defRPr sz="1040"/>
+              <a:defRPr sz="1200"/>
             </a:lvl1pPr>
-            <a:lvl2pPr marL="297180" indent="0">
-              <a:buNone/>
-              <a:defRPr sz="910"/>
+            <a:lvl2pPr marL="342900" indent="0">
+              <a:buNone/>
+              <a:defRPr sz="1050"/>
             </a:lvl2pPr>
-            <a:lvl3pPr marL="594360" indent="0">
-              <a:buNone/>
-              <a:defRPr sz="780"/>
+            <a:lvl3pPr marL="685800" indent="0">
+              <a:buNone/>
+              <a:defRPr sz="900"/>
             </a:lvl3pPr>
-            <a:lvl4pPr marL="891540" indent="0">
-              <a:buNone/>
-              <a:defRPr sz="650"/>
+            <a:lvl4pPr marL="1028700" indent="0">
+              <a:buNone/>
+              <a:defRPr sz="750"/>
             </a:lvl4pPr>
-            <a:lvl5pPr marL="1188720" indent="0">
-              <a:buNone/>
-              <a:defRPr sz="650"/>
+            <a:lvl5pPr marL="1371600" indent="0">
+              <a:buNone/>
+              <a:defRPr sz="750"/>
             </a:lvl5pPr>
-            <a:lvl6pPr marL="1485900" indent="0">
-              <a:buNone/>
-              <a:defRPr sz="650"/>
+            <a:lvl6pPr marL="1714500" indent="0">
+              <a:buNone/>
+              <a:defRPr sz="750"/>
             </a:lvl6pPr>
-            <a:lvl7pPr marL="1783080" indent="0">
-              <a:buNone/>
-              <a:defRPr sz="650"/>
+            <a:lvl7pPr marL="2057400" indent="0">
+              <a:buNone/>
+              <a:defRPr sz="750"/>
             </a:lvl7pPr>
-            <a:lvl8pPr marL="2080260" indent="0">
-              <a:buNone/>
-              <a:defRPr sz="650"/>
+            <a:lvl8pPr marL="2400300" indent="0">
+              <a:buNone/>
+              <a:defRPr sz="750"/>
             </a:lvl8pPr>
-            <a:lvl9pPr marL="2377440" indent="0">
-              <a:buNone/>
-              <a:defRPr sz="650"/>
+            <a:lvl9pPr marL="2743200" indent="0">
+              <a:buNone/>
+              <a:defRPr sz="750"/>
             </a:lvl9pPr>
           </a:lstStyle>
           <a:p>
@@ -2096,7 +2096,7 @@
           <a:p>
             <a:fld id="{4EA1F6FD-E570-49E4-ADDB-683FCB8AA891}" type="datetimeFigureOut">
               <a:rPr lang="en-US" smtClean="0"/>
-              <a:t>2/16/2023</a:t>
+              <a:t>2/23/2023</a:t>
             </a:fld>
             <a:endParaRPr lang="en-US"/>
           </a:p>
@@ -2147,7 +2147,7 @@
     </p:spTree>
     <p:extLst>
       <p:ext uri="{BB962C8B-B14F-4D97-AF65-F5344CB8AC3E}">
-        <p14:creationId xmlns:p14="http://schemas.microsoft.com/office/powerpoint/2010/main" val="3594379174"/>
+        <p14:creationId xmlns:p14="http://schemas.microsoft.com/office/powerpoint/2010/main" val="3326326130"/>
       </p:ext>
     </p:extLst>
   </p:cSld>
@@ -2186,15 +2186,15 @@
         </p:nvSpPr>
         <p:spPr>
           <a:xfrm>
-            <a:off x="409397" y="365760"/>
-            <a:ext cx="1916966" cy="1280160"/>
+            <a:off x="472381" y="365760"/>
+            <a:ext cx="2211884" cy="1280160"/>
           </a:xfrm>
         </p:spPr>
         <p:txBody>
           <a:bodyPr anchor="b"/>
           <a:lstStyle>
             <a:lvl1pPr>
-              <a:defRPr sz="2080"/>
+              <a:defRPr sz="2400"/>
             </a:lvl1pPr>
           </a:lstStyle>
           <a:p>
@@ -2218,8 +2218,8 @@
         </p:nvSpPr>
         <p:spPr>
           <a:xfrm>
-            <a:off x="2526804" y="789941"/>
-            <a:ext cx="3008948" cy="3898900"/>
+            <a:off x="2915543" y="789941"/>
+            <a:ext cx="3471863" cy="3898900"/>
           </a:xfrm>
         </p:spPr>
         <p:txBody>
@@ -2227,39 +2227,39 @@
           <a:lstStyle>
             <a:lvl1pPr marL="0" indent="0">
               <a:buNone/>
-              <a:defRPr sz="2080"/>
+              <a:defRPr sz="2400"/>
             </a:lvl1pPr>
-            <a:lvl2pPr marL="297180" indent="0">
-              <a:buNone/>
-              <a:defRPr sz="1820"/>
+            <a:lvl2pPr marL="342900" indent="0">
+              <a:buNone/>
+              <a:defRPr sz="2100"/>
             </a:lvl2pPr>
-            <a:lvl3pPr marL="594360" indent="0">
-              <a:buNone/>
-              <a:defRPr sz="1560"/>
+            <a:lvl3pPr marL="685800" indent="0">
+              <a:buNone/>
+              <a:defRPr sz="1800"/>
             </a:lvl3pPr>
-            <a:lvl4pPr marL="891540" indent="0">
-              <a:buNone/>
-              <a:defRPr sz="1300"/>
+            <a:lvl4pPr marL="1028700" indent="0">
+              <a:buNone/>
+              <a:defRPr sz="1500"/>
             </a:lvl4pPr>
-            <a:lvl5pPr marL="1188720" indent="0">
-              <a:buNone/>
-              <a:defRPr sz="1300"/>
+            <a:lvl5pPr marL="1371600" indent="0">
+              <a:buNone/>
+              <a:defRPr sz="1500"/>
             </a:lvl5pPr>
-            <a:lvl6pPr marL="1485900" indent="0">
-              <a:buNone/>
-              <a:defRPr sz="1300"/>
+            <a:lvl6pPr marL="1714500" indent="0">
+              <a:buNone/>
+              <a:defRPr sz="1500"/>
             </a:lvl6pPr>
-            <a:lvl7pPr marL="1783080" indent="0">
-              <a:buNone/>
-              <a:defRPr sz="1300"/>
+            <a:lvl7pPr marL="2057400" indent="0">
+              <a:buNone/>
+              <a:defRPr sz="1500"/>
             </a:lvl7pPr>
-            <a:lvl8pPr marL="2080260" indent="0">
-              <a:buNone/>
-              <a:defRPr sz="1300"/>
+            <a:lvl8pPr marL="2400300" indent="0">
+              <a:buNone/>
+              <a:defRPr sz="1500"/>
             </a:lvl8pPr>
-            <a:lvl9pPr marL="2377440" indent="0">
-              <a:buNone/>
-              <a:defRPr sz="1300"/>
+            <a:lvl9pPr marL="2743200" indent="0">
+              <a:buNone/>
+              <a:defRPr sz="1500"/>
             </a:lvl9pPr>
           </a:lstStyle>
           <a:p>
@@ -2283,8 +2283,8 @@
         </p:nvSpPr>
         <p:spPr>
           <a:xfrm>
-            <a:off x="409397" y="1645920"/>
-            <a:ext cx="1916966" cy="3049270"/>
+            <a:off x="472381" y="1645920"/>
+            <a:ext cx="2211884" cy="3049270"/>
           </a:xfrm>
         </p:spPr>
         <p:txBody>
@@ -2292,39 +2292,39 @@
           <a:lstStyle>
             <a:lvl1pPr marL="0" indent="0">
               <a:buNone/>
-              <a:defRPr sz="1040"/>
+              <a:defRPr sz="1200"/>
             </a:lvl1pPr>
-            <a:lvl2pPr marL="297180" indent="0">
-              <a:buNone/>
-              <a:defRPr sz="910"/>
+            <a:lvl2pPr marL="342900" indent="0">
+              <a:buNone/>
+              <a:defRPr sz="1050"/>
             </a:lvl2pPr>
-            <a:lvl3pPr marL="594360" indent="0">
-              <a:buNone/>
-              <a:defRPr sz="780"/>
+            <a:lvl3pPr marL="685800" indent="0">
+              <a:buNone/>
+              <a:defRPr sz="900"/>
             </a:lvl3pPr>
-            <a:lvl4pPr marL="891540" indent="0">
-              <a:buNone/>
-              <a:defRPr sz="650"/>
+            <a:lvl4pPr marL="1028700" indent="0">
+              <a:buNone/>
+              <a:defRPr sz="750"/>
             </a:lvl4pPr>
-            <a:lvl5pPr marL="1188720" indent="0">
-              <a:buNone/>
-              <a:defRPr sz="650"/>
+            <a:lvl5pPr marL="1371600" indent="0">
+              <a:buNone/>
+              <a:defRPr sz="750"/>
             </a:lvl5pPr>
-            <a:lvl6pPr marL="1485900" indent="0">
-              <a:buNone/>
-              <a:defRPr sz="650"/>
+            <a:lvl6pPr marL="1714500" indent="0">
+              <a:buNone/>
+              <a:defRPr sz="750"/>
             </a:lvl6pPr>
-            <a:lvl7pPr marL="1783080" indent="0">
-              <a:buNone/>
-              <a:defRPr sz="650"/>
+            <a:lvl7pPr marL="2057400" indent="0">
+              <a:buNone/>
+              <a:defRPr sz="750"/>
             </a:lvl7pPr>
-            <a:lvl8pPr marL="2080260" indent="0">
-              <a:buNone/>
-              <a:defRPr sz="650"/>
+            <a:lvl8pPr marL="2400300" indent="0">
+              <a:buNone/>
+              <a:defRPr sz="750"/>
             </a:lvl8pPr>
-            <a:lvl9pPr marL="2377440" indent="0">
-              <a:buNone/>
-              <a:defRPr sz="650"/>
+            <a:lvl9pPr marL="2743200" indent="0">
+              <a:buNone/>
+              <a:defRPr sz="750"/>
             </a:lvl9pPr>
           </a:lstStyle>
           <a:p>
@@ -2353,7 +2353,7 @@
           <a:p>
             <a:fld id="{4EA1F6FD-E570-49E4-ADDB-683FCB8AA891}" type="datetimeFigureOut">
               <a:rPr lang="en-US" smtClean="0"/>
-              <a:t>2/16/2023</a:t>
+              <a:t>2/23/2023</a:t>
             </a:fld>
             <a:endParaRPr lang="en-US"/>
           </a:p>
@@ -2404,7 +2404,7 @@
     </p:spTree>
     <p:extLst>
       <p:ext uri="{BB962C8B-B14F-4D97-AF65-F5344CB8AC3E}">
-        <p14:creationId xmlns:p14="http://schemas.microsoft.com/office/powerpoint/2010/main" val="2017606475"/>
+        <p14:creationId xmlns:p14="http://schemas.microsoft.com/office/powerpoint/2010/main" val="4196039596"/>
       </p:ext>
     </p:extLst>
   </p:cSld>
@@ -2448,8 +2448,8 @@
         </p:nvSpPr>
         <p:spPr>
           <a:xfrm>
-            <a:off x="408623" y="292101"/>
-            <a:ext cx="5126355" cy="1060450"/>
+            <a:off x="471488" y="292101"/>
+            <a:ext cx="5915025" cy="1060450"/>
           </a:xfrm>
           <a:prstGeom prst="rect">
             <a:avLst/>
@@ -2481,8 +2481,8 @@
         </p:nvSpPr>
         <p:spPr>
           <a:xfrm>
-            <a:off x="408623" y="1460500"/>
-            <a:ext cx="5126355" cy="3481070"/>
+            <a:off x="471488" y="1460500"/>
+            <a:ext cx="5915025" cy="3481070"/>
           </a:xfrm>
           <a:prstGeom prst="rect">
             <a:avLst/>
@@ -2543,8 +2543,8 @@
         </p:nvSpPr>
         <p:spPr>
           <a:xfrm>
-            <a:off x="408623" y="5085081"/>
-            <a:ext cx="1337310" cy="292100"/>
+            <a:off x="471488" y="5085081"/>
+            <a:ext cx="1543050" cy="292100"/>
           </a:xfrm>
           <a:prstGeom prst="rect">
             <a:avLst/>
@@ -2554,7 +2554,7 @@
           <a:bodyPr vert="horz" lIns="91440" tIns="45720" rIns="91440" bIns="45720" rtlCol="0" anchor="ctr"/>
           <a:lstStyle>
             <a:lvl1pPr algn="l">
-              <a:defRPr sz="780">
+              <a:defRPr sz="900">
                 <a:solidFill>
                   <a:schemeClr val="tx1">
                     <a:tint val="75000"/>
@@ -2566,7 +2566,7 @@
           <a:p>
             <a:fld id="{4EA1F6FD-E570-49E4-ADDB-683FCB8AA891}" type="datetimeFigureOut">
               <a:rPr lang="en-US" smtClean="0"/>
-              <a:t>2/16/2023</a:t>
+              <a:t>2/23/2023</a:t>
             </a:fld>
             <a:endParaRPr lang="en-US"/>
           </a:p>
@@ -2584,8 +2584,8 @@
         </p:nvSpPr>
         <p:spPr>
           <a:xfrm>
-            <a:off x="1968818" y="5085081"/>
-            <a:ext cx="2005965" cy="292100"/>
+            <a:off x="2271713" y="5085081"/>
+            <a:ext cx="2314575" cy="292100"/>
           </a:xfrm>
           <a:prstGeom prst="rect">
             <a:avLst/>
@@ -2595,7 +2595,7 @@
           <a:bodyPr vert="horz" lIns="91440" tIns="45720" rIns="91440" bIns="45720" rtlCol="0" anchor="ctr"/>
           <a:lstStyle>
             <a:lvl1pPr algn="ctr">
-              <a:defRPr sz="780">
+              <a:defRPr sz="900">
                 <a:solidFill>
                   <a:schemeClr val="tx1">
                     <a:tint val="75000"/>
@@ -2621,8 +2621,8 @@
         </p:nvSpPr>
         <p:spPr>
           <a:xfrm>
-            <a:off x="4197668" y="5085081"/>
-            <a:ext cx="1337310" cy="292100"/>
+            <a:off x="4843463" y="5085081"/>
+            <a:ext cx="1543050" cy="292100"/>
           </a:xfrm>
           <a:prstGeom prst="rect">
             <a:avLst/>
@@ -2632,7 +2632,7 @@
           <a:bodyPr vert="horz" lIns="91440" tIns="45720" rIns="91440" bIns="45720" rtlCol="0" anchor="ctr"/>
           <a:lstStyle>
             <a:lvl1pPr algn="r">
-              <a:defRPr sz="780">
+              <a:defRPr sz="900">
                 <a:solidFill>
                   <a:schemeClr val="tx1">
                     <a:tint val="75000"/>
@@ -2653,27 +2653,27 @@
     </p:spTree>
     <p:extLst>
       <p:ext uri="{BB962C8B-B14F-4D97-AF65-F5344CB8AC3E}">
-        <p14:creationId xmlns:p14="http://schemas.microsoft.com/office/powerpoint/2010/main" val="4084283334"/>
+        <p14:creationId xmlns:p14="http://schemas.microsoft.com/office/powerpoint/2010/main" val="2068847397"/>
       </p:ext>
     </p:extLst>
   </p:cSld>
   <p:clrMap bg1="lt1" tx1="dk1" bg2="lt2" tx2="dk2" accent1="accent1" accent2="accent2" accent3="accent3" accent4="accent4" accent5="accent5" accent6="accent6" hlink="hlink" folHlink="folHlink"/>
   <p:sldLayoutIdLst>
-    <p:sldLayoutId id="2147483709" r:id="rId1"/>
-    <p:sldLayoutId id="2147483710" r:id="rId2"/>
-    <p:sldLayoutId id="2147483711" r:id="rId3"/>
-    <p:sldLayoutId id="2147483712" r:id="rId4"/>
-    <p:sldLayoutId id="2147483713" r:id="rId5"/>
-    <p:sldLayoutId id="2147483714" r:id="rId6"/>
-    <p:sldLayoutId id="2147483715" r:id="rId7"/>
-    <p:sldLayoutId id="2147483716" r:id="rId8"/>
-    <p:sldLayoutId id="2147483717" r:id="rId9"/>
-    <p:sldLayoutId id="2147483718" r:id="rId10"/>
-    <p:sldLayoutId id="2147483719" r:id="rId11"/>
+    <p:sldLayoutId id="2147483721" r:id="rId1"/>
+    <p:sldLayoutId id="2147483722" r:id="rId2"/>
+    <p:sldLayoutId id="2147483723" r:id="rId3"/>
+    <p:sldLayoutId id="2147483724" r:id="rId4"/>
+    <p:sldLayoutId id="2147483725" r:id="rId5"/>
+    <p:sldLayoutId id="2147483726" r:id="rId6"/>
+    <p:sldLayoutId id="2147483727" r:id="rId7"/>
+    <p:sldLayoutId id="2147483728" r:id="rId8"/>
+    <p:sldLayoutId id="2147483729" r:id="rId9"/>
+    <p:sldLayoutId id="2147483730" r:id="rId10"/>
+    <p:sldLayoutId id="2147483731" r:id="rId11"/>
   </p:sldLayoutIdLst>
   <p:txStyles>
     <p:titleStyle>
-      <a:lvl1pPr algn="l" defTabSz="594360" rtl="0" eaLnBrk="1" latinLnBrk="0" hangingPunct="1">
+      <a:lvl1pPr algn="l" defTabSz="685800" rtl="0" eaLnBrk="1" latinLnBrk="0" hangingPunct="1">
         <a:lnSpc>
           <a:spcPct val="90000"/>
         </a:lnSpc>
@@ -2681,7 +2681,7 @@
           <a:spcPct val="0"/>
         </a:spcBef>
         <a:buNone/>
-        <a:defRPr sz="2860" kern="1200">
+        <a:defRPr sz="3300" kern="1200">
           <a:solidFill>
             <a:schemeClr val="tx1"/>
           </a:solidFill>
@@ -2692,16 +2692,16 @@
       </a:lvl1pPr>
     </p:titleStyle>
     <p:bodyStyle>
-      <a:lvl1pPr marL="148590" indent="-148590" algn="l" defTabSz="594360" rtl="0" eaLnBrk="1" latinLnBrk="0" hangingPunct="1">
+      <a:lvl1pPr marL="171450" indent="-171450" algn="l" defTabSz="685800" rtl="0" eaLnBrk="1" latinLnBrk="0" hangingPunct="1">
         <a:lnSpc>
           <a:spcPct val="90000"/>
         </a:lnSpc>
         <a:spcBef>
-          <a:spcPts val="650"/>
+          <a:spcPts val="750"/>
         </a:spcBef>
         <a:buFont typeface="Arial" panose="020B0604020202020204" pitchFamily="34" charset="0"/>
         <a:buChar char="•"/>
-        <a:defRPr sz="1820" kern="1200">
+        <a:defRPr sz="2100" kern="1200">
           <a:solidFill>
             <a:schemeClr val="tx1"/>
           </a:solidFill>
@@ -2710,16 +2710,16 @@
           <a:cs typeface="+mn-cs"/>
         </a:defRPr>
       </a:lvl1pPr>
-      <a:lvl2pPr marL="445770" indent="-148590" algn="l" defTabSz="594360" rtl="0" eaLnBrk="1" latinLnBrk="0" hangingPunct="1">
+      <a:lvl2pPr marL="514350" indent="-171450" algn="l" defTabSz="685800" rtl="0" eaLnBrk="1" latinLnBrk="0" hangingPunct="1">
         <a:lnSpc>
           <a:spcPct val="90000"/>
         </a:lnSpc>
         <a:spcBef>
-          <a:spcPts val="325"/>
+          <a:spcPts val="375"/>
         </a:spcBef>
         <a:buFont typeface="Arial" panose="020B0604020202020204" pitchFamily="34" charset="0"/>
         <a:buChar char="•"/>
-        <a:defRPr sz="1560" kern="1200">
+        <a:defRPr sz="1800" kern="1200">
           <a:solidFill>
             <a:schemeClr val="tx1"/>
           </a:solidFill>
@@ -2728,16 +2728,16 @@
           <a:cs typeface="+mn-cs"/>
         </a:defRPr>
       </a:lvl2pPr>
-      <a:lvl3pPr marL="742950" indent="-148590" algn="l" defTabSz="594360" rtl="0" eaLnBrk="1" latinLnBrk="0" hangingPunct="1">
+      <a:lvl3pPr marL="857250" indent="-171450" algn="l" defTabSz="685800" rtl="0" eaLnBrk="1" latinLnBrk="0" hangingPunct="1">
         <a:lnSpc>
           <a:spcPct val="90000"/>
         </a:lnSpc>
         <a:spcBef>
-          <a:spcPts val="325"/>
+          <a:spcPts val="375"/>
         </a:spcBef>
         <a:buFont typeface="Arial" panose="020B0604020202020204" pitchFamily="34" charset="0"/>
         <a:buChar char="•"/>
-        <a:defRPr sz="1300" kern="1200">
+        <a:defRPr sz="1500" kern="1200">
           <a:solidFill>
             <a:schemeClr val="tx1"/>
           </a:solidFill>
@@ -2746,16 +2746,16 @@
           <a:cs typeface="+mn-cs"/>
         </a:defRPr>
       </a:lvl3pPr>
-      <a:lvl4pPr marL="1040130" indent="-148590" algn="l" defTabSz="594360" rtl="0" eaLnBrk="1" latinLnBrk="0" hangingPunct="1">
+      <a:lvl4pPr marL="1200150" indent="-171450" algn="l" defTabSz="685800" rtl="0" eaLnBrk="1" latinLnBrk="0" hangingPunct="1">
         <a:lnSpc>
           <a:spcPct val="90000"/>
         </a:lnSpc>
         <a:spcBef>
-          <a:spcPts val="325"/>
+          <a:spcPts val="375"/>
         </a:spcBef>
         <a:buFont typeface="Arial" panose="020B0604020202020204" pitchFamily="34" charset="0"/>
         <a:buChar char="•"/>
-        <a:defRPr sz="1170" kern="1200">
+        <a:defRPr sz="1350" kern="1200">
           <a:solidFill>
             <a:schemeClr val="tx1"/>
           </a:solidFill>
@@ -2764,16 +2764,16 @@
           <a:cs typeface="+mn-cs"/>
         </a:defRPr>
       </a:lvl4pPr>
-      <a:lvl5pPr marL="1337310" indent="-148590" algn="l" defTabSz="594360" rtl="0" eaLnBrk="1" latinLnBrk="0" hangingPunct="1">
+      <a:lvl5pPr marL="1543050" indent="-171450" algn="l" defTabSz="685800" rtl="0" eaLnBrk="1" latinLnBrk="0" hangingPunct="1">
         <a:lnSpc>
           <a:spcPct val="90000"/>
         </a:lnSpc>
         <a:spcBef>
-          <a:spcPts val="325"/>
+          <a:spcPts val="375"/>
         </a:spcBef>
         <a:buFont typeface="Arial" panose="020B0604020202020204" pitchFamily="34" charset="0"/>
         <a:buChar char="•"/>
-        <a:defRPr sz="1170" kern="1200">
+        <a:defRPr sz="1350" kern="1200">
           <a:solidFill>
             <a:schemeClr val="tx1"/>
           </a:solidFill>
@@ -2782,16 +2782,16 @@
           <a:cs typeface="+mn-cs"/>
         </a:defRPr>
       </a:lvl5pPr>
-      <a:lvl6pPr marL="1634490" indent="-148590" algn="l" defTabSz="594360" rtl="0" eaLnBrk="1" latinLnBrk="0" hangingPunct="1">
+      <a:lvl6pPr marL="1885950" indent="-171450" algn="l" defTabSz="685800" rtl="0" eaLnBrk="1" latinLnBrk="0" hangingPunct="1">
         <a:lnSpc>
           <a:spcPct val="90000"/>
         </a:lnSpc>
         <a:spcBef>
-          <a:spcPts val="325"/>
+          <a:spcPts val="375"/>
         </a:spcBef>
         <a:buFont typeface="Arial" panose="020B0604020202020204" pitchFamily="34" charset="0"/>
         <a:buChar char="•"/>
-        <a:defRPr sz="1170" kern="1200">
+        <a:defRPr sz="1350" kern="1200">
           <a:solidFill>
             <a:schemeClr val="tx1"/>
           </a:solidFill>
@@ -2800,16 +2800,16 @@
           <a:cs typeface="+mn-cs"/>
         </a:defRPr>
       </a:lvl6pPr>
-      <a:lvl7pPr marL="1931670" indent="-148590" algn="l" defTabSz="594360" rtl="0" eaLnBrk="1" latinLnBrk="0" hangingPunct="1">
+      <a:lvl7pPr marL="2228850" indent="-171450" algn="l" defTabSz="685800" rtl="0" eaLnBrk="1" latinLnBrk="0" hangingPunct="1">
         <a:lnSpc>
           <a:spcPct val="90000"/>
         </a:lnSpc>
         <a:spcBef>
-          <a:spcPts val="325"/>
+          <a:spcPts val="375"/>
         </a:spcBef>
         <a:buFont typeface="Arial" panose="020B0604020202020204" pitchFamily="34" charset="0"/>
         <a:buChar char="•"/>
-        <a:defRPr sz="1170" kern="1200">
+        <a:defRPr sz="1350" kern="1200">
           <a:solidFill>
             <a:schemeClr val="tx1"/>
           </a:solidFill>
@@ -2818,16 +2818,16 @@
           <a:cs typeface="+mn-cs"/>
         </a:defRPr>
       </a:lvl7pPr>
-      <a:lvl8pPr marL="2228850" indent="-148590" algn="l" defTabSz="594360" rtl="0" eaLnBrk="1" latinLnBrk="0" hangingPunct="1">
+      <a:lvl8pPr marL="2571750" indent="-171450" algn="l" defTabSz="685800" rtl="0" eaLnBrk="1" latinLnBrk="0" hangingPunct="1">
         <a:lnSpc>
           <a:spcPct val="90000"/>
         </a:lnSpc>
         <a:spcBef>
-          <a:spcPts val="325"/>
+          <a:spcPts val="375"/>
         </a:spcBef>
         <a:buFont typeface="Arial" panose="020B0604020202020204" pitchFamily="34" charset="0"/>
         <a:buChar char="•"/>
-        <a:defRPr sz="1170" kern="1200">
+        <a:defRPr sz="1350" kern="1200">
           <a:solidFill>
             <a:schemeClr val="tx1"/>
           </a:solidFill>
@@ -2836,16 +2836,16 @@
           <a:cs typeface="+mn-cs"/>
         </a:defRPr>
       </a:lvl8pPr>
-      <a:lvl9pPr marL="2526030" indent="-148590" algn="l" defTabSz="594360" rtl="0" eaLnBrk="1" latinLnBrk="0" hangingPunct="1">
+      <a:lvl9pPr marL="2914650" indent="-171450" algn="l" defTabSz="685800" rtl="0" eaLnBrk="1" latinLnBrk="0" hangingPunct="1">
         <a:lnSpc>
           <a:spcPct val="90000"/>
         </a:lnSpc>
         <a:spcBef>
-          <a:spcPts val="325"/>
+          <a:spcPts val="375"/>
         </a:spcBef>
         <a:buFont typeface="Arial" panose="020B0604020202020204" pitchFamily="34" charset="0"/>
         <a:buChar char="•"/>
-        <a:defRPr sz="1170" kern="1200">
+        <a:defRPr sz="1350" kern="1200">
           <a:solidFill>
             <a:schemeClr val="tx1"/>
           </a:solidFill>
@@ -2859,8 +2859,8 @@
       <a:defPPr>
         <a:defRPr lang="en-US"/>
       </a:defPPr>
-      <a:lvl1pPr marL="0" algn="l" defTabSz="594360" rtl="0" eaLnBrk="1" latinLnBrk="0" hangingPunct="1">
-        <a:defRPr sz="1170" kern="1200">
+      <a:lvl1pPr marL="0" algn="l" defTabSz="685800" rtl="0" eaLnBrk="1" latinLnBrk="0" hangingPunct="1">
+        <a:defRPr sz="1350" kern="1200">
           <a:solidFill>
             <a:schemeClr val="tx1"/>
           </a:solidFill>
@@ -2869,8 +2869,8 @@
           <a:cs typeface="+mn-cs"/>
         </a:defRPr>
       </a:lvl1pPr>
-      <a:lvl2pPr marL="297180" algn="l" defTabSz="594360" rtl="0" eaLnBrk="1" latinLnBrk="0" hangingPunct="1">
-        <a:defRPr sz="1170" kern="1200">
+      <a:lvl2pPr marL="342900" algn="l" defTabSz="685800" rtl="0" eaLnBrk="1" latinLnBrk="0" hangingPunct="1">
+        <a:defRPr sz="1350" kern="1200">
           <a:solidFill>
             <a:schemeClr val="tx1"/>
           </a:solidFill>
@@ -2879,8 +2879,8 @@
           <a:cs typeface="+mn-cs"/>
         </a:defRPr>
       </a:lvl2pPr>
-      <a:lvl3pPr marL="594360" algn="l" defTabSz="594360" rtl="0" eaLnBrk="1" latinLnBrk="0" hangingPunct="1">
-        <a:defRPr sz="1170" kern="1200">
+      <a:lvl3pPr marL="685800" algn="l" defTabSz="685800" rtl="0" eaLnBrk="1" latinLnBrk="0" hangingPunct="1">
+        <a:defRPr sz="1350" kern="1200">
           <a:solidFill>
             <a:schemeClr val="tx1"/>
           </a:solidFill>
@@ -2889,8 +2889,8 @@
           <a:cs typeface="+mn-cs"/>
         </a:defRPr>
       </a:lvl3pPr>
-      <a:lvl4pPr marL="891540" algn="l" defTabSz="594360" rtl="0" eaLnBrk="1" latinLnBrk="0" hangingPunct="1">
-        <a:defRPr sz="1170" kern="1200">
+      <a:lvl4pPr marL="1028700" algn="l" defTabSz="685800" rtl="0" eaLnBrk="1" latinLnBrk="0" hangingPunct="1">
+        <a:defRPr sz="1350" kern="1200">
           <a:solidFill>
             <a:schemeClr val="tx1"/>
           </a:solidFill>
@@ -2899,8 +2899,8 @@
           <a:cs typeface="+mn-cs"/>
         </a:defRPr>
       </a:lvl4pPr>
-      <a:lvl5pPr marL="1188720" algn="l" defTabSz="594360" rtl="0" eaLnBrk="1" latinLnBrk="0" hangingPunct="1">
-        <a:defRPr sz="1170" kern="1200">
+      <a:lvl5pPr marL="1371600" algn="l" defTabSz="685800" rtl="0" eaLnBrk="1" latinLnBrk="0" hangingPunct="1">
+        <a:defRPr sz="1350" kern="1200">
           <a:solidFill>
             <a:schemeClr val="tx1"/>
           </a:solidFill>
@@ -2909,8 +2909,8 @@
           <a:cs typeface="+mn-cs"/>
         </a:defRPr>
       </a:lvl5pPr>
-      <a:lvl6pPr marL="1485900" algn="l" defTabSz="594360" rtl="0" eaLnBrk="1" latinLnBrk="0" hangingPunct="1">
-        <a:defRPr sz="1170" kern="1200">
+      <a:lvl6pPr marL="1714500" algn="l" defTabSz="685800" rtl="0" eaLnBrk="1" latinLnBrk="0" hangingPunct="1">
+        <a:defRPr sz="1350" kern="1200">
           <a:solidFill>
             <a:schemeClr val="tx1"/>
           </a:solidFill>
@@ -2919,8 +2919,8 @@
           <a:cs typeface="+mn-cs"/>
         </a:defRPr>
       </a:lvl6pPr>
-      <a:lvl7pPr marL="1783080" algn="l" defTabSz="594360" rtl="0" eaLnBrk="1" latinLnBrk="0" hangingPunct="1">
-        <a:defRPr sz="1170" kern="1200">
+      <a:lvl7pPr marL="2057400" algn="l" defTabSz="685800" rtl="0" eaLnBrk="1" latinLnBrk="0" hangingPunct="1">
+        <a:defRPr sz="1350" kern="1200">
           <a:solidFill>
             <a:schemeClr val="tx1"/>
           </a:solidFill>
@@ -2929,8 +2929,8 @@
           <a:cs typeface="+mn-cs"/>
         </a:defRPr>
       </a:lvl7pPr>
-      <a:lvl8pPr marL="2080260" algn="l" defTabSz="594360" rtl="0" eaLnBrk="1" latinLnBrk="0" hangingPunct="1">
-        <a:defRPr sz="1170" kern="1200">
+      <a:lvl8pPr marL="2400300" algn="l" defTabSz="685800" rtl="0" eaLnBrk="1" latinLnBrk="0" hangingPunct="1">
+        <a:defRPr sz="1350" kern="1200">
           <a:solidFill>
             <a:schemeClr val="tx1"/>
           </a:solidFill>
@@ -2939,8 +2939,8 @@
           <a:cs typeface="+mn-cs"/>
         </a:defRPr>
       </a:lvl8pPr>
-      <a:lvl9pPr marL="2377440" algn="l" defTabSz="594360" rtl="0" eaLnBrk="1" latinLnBrk="0" hangingPunct="1">
-        <a:defRPr sz="1170" kern="1200">
+      <a:lvl9pPr marL="2743200" algn="l" defTabSz="685800" rtl="0" eaLnBrk="1" latinLnBrk="0" hangingPunct="1">
+        <a:defRPr sz="1350" kern="1200">
           <a:solidFill>
             <a:schemeClr val="tx1"/>
           </a:solidFill>
@@ -2985,8 +2985,8 @@
         </p:nvSpPr>
         <p:spPr>
           <a:xfrm>
-            <a:off x="-83820" y="180517"/>
-            <a:ext cx="5943600" cy="430887"/>
+            <a:off x="-96715" y="105507"/>
+            <a:ext cx="6858000" cy="430887"/>
           </a:xfrm>
           <a:prstGeom prst="rect">
             <a:avLst/>
@@ -3025,14 +3025,14 @@
           <p:nvPr>
             <p:extLst>
               <p:ext uri="{D42A27DB-BD31-4B8C-83A1-F6EECF244321}">
-                <p14:modId xmlns:p14="http://schemas.microsoft.com/office/powerpoint/2010/main" val="3646848280"/>
+                <p14:modId xmlns:p14="http://schemas.microsoft.com/office/powerpoint/2010/main" val="2003502501"/>
               </p:ext>
             </p:extLst>
           </p:nvPr>
         </p:nvGraphicFramePr>
         <p:xfrm>
-          <a:off x="41910" y="815523"/>
-          <a:ext cx="5859780" cy="4490360"/>
+          <a:off x="13189" y="668215"/>
+          <a:ext cx="6809642" cy="4572000"/>
         </p:xfrm>
         <a:graphic>
           <a:graphicData uri="http://schemas.openxmlformats.org/drawingml/2006/table">
@@ -3041,7 +3041,7 @@
                 <a:tableStyleId>{9D7B26C5-4107-4FEC-AEDC-1716B250A1EF}</a:tableStyleId>
               </a:tblPr>
               <a:tblGrid>
-                <a:gridCol w="5859780">
+                <a:gridCol w="6809642">
                   <a:extLst>
                     <a:ext uri="{9D8B030D-6E8A-4147-A177-3AD203B41FA5}">
                       <a16:colId xmlns:a16="http://schemas.microsoft.com/office/drawing/2014/main" val="3330447840"/>
@@ -3049,7 +3049,7 @@
                   </a:extLst>
                 </a:gridCol>
               </a:tblGrid>
-              <a:tr h="224518">
+              <a:tr h="228600">
                 <a:tc>
                   <a:txBody>
                     <a:bodyPr/>
@@ -3081,7 +3081,7 @@
                       </a:endParaRPr>
                     </a:p>
                   </a:txBody>
-                  <a:tcPr marL="2773" marR="2773" marT="2773" marB="0" anchor="ctr">
+                  <a:tcPr marL="3200" marR="3200" marT="3200" marB="0" anchor="ctr">
                     <a:solidFill>
                       <a:schemeClr val="accent5">
                         <a:lumMod val="20000"/>
@@ -3096,7 +3096,7 @@
                   </a:ext>
                 </a:extLst>
               </a:tr>
-              <a:tr h="224518">
+              <a:tr h="228600">
                 <a:tc>
                   <a:txBody>
                     <a:bodyPr/>
@@ -3128,7 +3128,7 @@
                       </a:endParaRPr>
                     </a:p>
                   </a:txBody>
-                  <a:tcPr marL="2773" marR="2773" marT="2773" marB="0" anchor="ctr"/>
+                  <a:tcPr marL="3200" marR="3200" marT="3200" marB="0" anchor="ctr"/>
                 </a:tc>
                 <a:extLst>
                   <a:ext uri="{0D108BD9-81ED-4DB2-BD59-A6C34878D82A}">
@@ -3136,7 +3136,7 @@
                   </a:ext>
                 </a:extLst>
               </a:tr>
-              <a:tr h="224518">
+              <a:tr h="228600">
                 <a:tc>
                   <a:txBody>
                     <a:bodyPr/>
@@ -3168,7 +3168,7 @@
                       </a:endParaRPr>
                     </a:p>
                   </a:txBody>
-                  <a:tcPr marL="2773" marR="2773" marT="2773" marB="0" anchor="ctr">
+                  <a:tcPr marL="3200" marR="3200" marT="3200" marB="0" anchor="ctr">
                     <a:lnB>
                       <a:noFill/>
                     </a:lnB>
@@ -3180,7 +3180,7 @@
                   </a:ext>
                 </a:extLst>
               </a:tr>
-              <a:tr h="224518">
+              <a:tr h="228600">
                 <a:tc>
                   <a:txBody>
                     <a:bodyPr/>
@@ -3212,7 +3212,7 @@
                       </a:endParaRPr>
                     </a:p>
                   </a:txBody>
-                  <a:tcPr marL="2773" marR="2773" marT="2773" marB="0" anchor="ctr">
+                  <a:tcPr marL="3200" marR="3200" marT="3200" marB="0" anchor="ctr">
                     <a:lnL>
                       <a:noFill/>
                     </a:lnL>
@@ -3247,7 +3247,7 @@
                   </a:ext>
                 </a:extLst>
               </a:tr>
-              <a:tr h="224518">
+              <a:tr h="228600">
                 <a:tc>
                   <a:txBody>
                     <a:bodyPr/>
@@ -3267,7 +3267,7 @@
                           <a:latin typeface="Times New Roman" panose="02020603050405020304" pitchFamily="18" charset="0"/>
                           <a:cs typeface="Times New Roman" panose="02020603050405020304" pitchFamily="18" charset="0"/>
                         </a:rPr>
-                        <a:t>a) U.S. counties*</a:t>
+                        <a:t>a) U.S. counties *</a:t>
                       </a:r>
                       <a:endParaRPr lang="en-US" sz="1100" b="0" i="0" u="none" strike="noStrike" dirty="0">
                         <a:solidFill>
@@ -3279,7 +3279,7 @@
                       </a:endParaRPr>
                     </a:p>
                   </a:txBody>
-                  <a:tcPr marL="2773" marR="2773" marT="2773" marB="0" anchor="ctr">
+                  <a:tcPr marL="3200" marR="3200" marT="3200" marB="0" anchor="ctr">
                     <a:lnT>
                       <a:noFill/>
                     </a:lnT>
@@ -3291,7 +3291,7 @@
                   </a:ext>
                 </a:extLst>
               </a:tr>
-              <a:tr h="224518">
+              <a:tr h="228600">
                 <a:tc>
                   <a:txBody>
                     <a:bodyPr/>
@@ -3323,7 +3323,7 @@
                       </a:endParaRPr>
                     </a:p>
                   </a:txBody>
-                  <a:tcPr marL="2773" marR="2773" marT="2773" marB="0" anchor="ctr"/>
+                  <a:tcPr marL="3200" marR="3200" marT="3200" marB="0" anchor="ctr"/>
                 </a:tc>
                 <a:extLst>
                   <a:ext uri="{0D108BD9-81ED-4DB2-BD59-A6C34878D82A}">
@@ -3331,7 +3331,7 @@
                   </a:ext>
                 </a:extLst>
               </a:tr>
-              <a:tr h="224518">
+              <a:tr h="228600">
                 <a:tc>
                   <a:txBody>
                     <a:bodyPr/>
@@ -3355,7 +3355,7 @@
                       </a:r>
                     </a:p>
                   </a:txBody>
-                  <a:tcPr marL="2773" marR="2773" marT="2773" marB="0" anchor="ctr"/>
+                  <a:tcPr marL="3200" marR="3200" marT="3200" marB="0" anchor="ctr"/>
                 </a:tc>
                 <a:extLst>
                   <a:ext uri="{0D108BD9-81ED-4DB2-BD59-A6C34878D82A}">
@@ -3363,7 +3363,7 @@
                   </a:ext>
                 </a:extLst>
               </a:tr>
-              <a:tr h="224518">
+              <a:tr h="228600">
                 <a:tc>
                   <a:txBody>
                     <a:bodyPr/>
@@ -3395,7 +3395,7 @@
                       </a:endParaRPr>
                     </a:p>
                   </a:txBody>
-                  <a:tcPr marL="2773" marR="2773" marT="2773" marB="0" anchor="ctr">
+                  <a:tcPr marL="3200" marR="3200" marT="3200" marB="0" anchor="ctr">
                     <a:solidFill>
                       <a:schemeClr val="accent5">
                         <a:lumMod val="20000"/>
@@ -3410,7 +3410,7 @@
                   </a:ext>
                 </a:extLst>
               </a:tr>
-              <a:tr h="224518">
+              <a:tr h="228600">
                 <a:tc>
                   <a:txBody>
                     <a:bodyPr/>
@@ -3430,7 +3430,7 @@
                           <a:latin typeface="Times New Roman" panose="02020603050405020304" pitchFamily="18" charset="0"/>
                           <a:cs typeface="Times New Roman" panose="02020603050405020304" pitchFamily="18" charset="0"/>
                         </a:rPr>
-                        <a:t>a) ±40 days</a:t>
+                        <a:t>a) ±40 days *</a:t>
                       </a:r>
                       <a:endParaRPr lang="en-US" sz="1100" b="0" i="0" u="none" strike="noStrike" dirty="0">
                         <a:solidFill>
@@ -3442,7 +3442,7 @@
                       </a:endParaRPr>
                     </a:p>
                   </a:txBody>
-                  <a:tcPr marL="2773" marR="2773" marT="2773" marB="0" anchor="ctr"/>
+                  <a:tcPr marL="3200" marR="3200" marT="3200" marB="0" anchor="ctr"/>
                 </a:tc>
                 <a:extLst>
                   <a:ext uri="{0D108BD9-81ED-4DB2-BD59-A6C34878D82A}">
@@ -3450,7 +3450,7 @@
                   </a:ext>
                 </a:extLst>
               </a:tr>
-              <a:tr h="224518">
+              <a:tr h="228600">
                 <a:tc>
                   <a:txBody>
                     <a:bodyPr/>
@@ -3482,7 +3482,7 @@
                       </a:endParaRPr>
                     </a:p>
                   </a:txBody>
-                  <a:tcPr marL="2773" marR="2773" marT="2773" marB="0" anchor="ctr"/>
+                  <a:tcPr marL="3200" marR="3200" marT="3200" marB="0" anchor="ctr"/>
                 </a:tc>
                 <a:extLst>
                   <a:ext uri="{0D108BD9-81ED-4DB2-BD59-A6C34878D82A}">
@@ -3490,7 +3490,7 @@
                   </a:ext>
                 </a:extLst>
               </a:tr>
-              <a:tr h="224518">
+              <a:tr h="228600">
                 <a:tc>
                   <a:txBody>
                     <a:bodyPr/>
@@ -3536,7 +3536,7 @@
                       </a:r>
                     </a:p>
                   </a:txBody>
-                  <a:tcPr marL="2773" marR="2773" marT="2773" marB="0" anchor="ctr"/>
+                  <a:tcPr marL="3200" marR="3200" marT="3200" marB="0" anchor="ctr"/>
                 </a:tc>
                 <a:extLst>
                   <a:ext uri="{0D108BD9-81ED-4DB2-BD59-A6C34878D82A}">
@@ -3544,7 +3544,7 @@
                   </a:ext>
                 </a:extLst>
               </a:tr>
-              <a:tr h="224518">
+              <a:tr h="228600">
                 <a:tc>
                   <a:txBody>
                     <a:bodyPr/>
@@ -3576,7 +3576,7 @@
                       </a:endParaRPr>
                     </a:p>
                   </a:txBody>
-                  <a:tcPr marL="2773" marR="2773" marT="2773" marB="0" anchor="ctr">
+                  <a:tcPr marL="3200" marR="3200" marT="3200" marB="0" anchor="ctr">
                     <a:solidFill>
                       <a:schemeClr val="accent5">
                         <a:lumMod val="20000"/>
@@ -3591,7 +3591,7 @@
                   </a:ext>
                 </a:extLst>
               </a:tr>
-              <a:tr h="224518">
+              <a:tr h="228600">
                 <a:tc>
                   <a:txBody>
                     <a:bodyPr/>
@@ -3623,7 +3623,7 @@
                       </a:endParaRPr>
                     </a:p>
                   </a:txBody>
-                  <a:tcPr marL="2773" marR="2773" marT="2773" marB="0" anchor="ctr"/>
+                  <a:tcPr marL="3200" marR="3200" marT="3200" marB="0" anchor="ctr"/>
                 </a:tc>
                 <a:extLst>
                   <a:ext uri="{0D108BD9-81ED-4DB2-BD59-A6C34878D82A}">
@@ -3631,7 +3631,7 @@
                   </a:ext>
                 </a:extLst>
               </a:tr>
-              <a:tr h="224518">
+              <a:tr h="228600">
                 <a:tc>
                   <a:txBody>
                     <a:bodyPr/>
@@ -3663,7 +3663,7 @@
                       </a:endParaRPr>
                     </a:p>
                   </a:txBody>
-                  <a:tcPr marL="2773" marR="2773" marT="2773" marB="0" anchor="ctr"/>
+                  <a:tcPr marL="3200" marR="3200" marT="3200" marB="0" anchor="ctr"/>
                 </a:tc>
                 <a:extLst>
                   <a:ext uri="{0D108BD9-81ED-4DB2-BD59-A6C34878D82A}">
@@ -3671,7 +3671,7 @@
                   </a:ext>
                 </a:extLst>
               </a:tr>
-              <a:tr h="224518">
+              <a:tr h="228600">
                 <a:tc>
                   <a:txBody>
                     <a:bodyPr/>
@@ -3703,7 +3703,7 @@
                       </a:endParaRPr>
                     </a:p>
                   </a:txBody>
-                  <a:tcPr marL="2773" marR="2773" marT="2773" marB="0" anchor="ctr">
+                  <a:tcPr marL="3200" marR="3200" marT="3200" marB="0" anchor="ctr">
                     <a:solidFill>
                       <a:schemeClr val="accent5">
                         <a:lumMod val="20000"/>
@@ -3718,7 +3718,7 @@
                   </a:ext>
                 </a:extLst>
               </a:tr>
-              <a:tr h="224518">
+              <a:tr h="228600">
                 <a:tc>
                   <a:txBody>
                     <a:bodyPr/>
@@ -3750,7 +3750,7 @@
                       </a:endParaRPr>
                     </a:p>
                   </a:txBody>
-                  <a:tcPr marL="2773" marR="2773" marT="2773" marB="0" anchor="ctr"/>
+                  <a:tcPr marL="3200" marR="3200" marT="3200" marB="0" anchor="ctr"/>
                 </a:tc>
                 <a:extLst>
                   <a:ext uri="{0D108BD9-81ED-4DB2-BD59-A6C34878D82A}">
@@ -3758,7 +3758,7 @@
                   </a:ext>
                 </a:extLst>
               </a:tr>
-              <a:tr h="224518">
+              <a:tr h="228600">
                 <a:tc>
                   <a:txBody>
                     <a:bodyPr/>
@@ -3790,7 +3790,7 @@
                       </a:endParaRPr>
                     </a:p>
                   </a:txBody>
-                  <a:tcPr marL="2773" marR="2773" marT="2773" marB="0" anchor="ctr"/>
+                  <a:tcPr marL="3200" marR="3200" marT="3200" marB="0" anchor="ctr"/>
                 </a:tc>
                 <a:extLst>
                   <a:ext uri="{0D108BD9-81ED-4DB2-BD59-A6C34878D82A}">
@@ -3798,7 +3798,7 @@
                   </a:ext>
                 </a:extLst>
               </a:tr>
-              <a:tr h="224518">
+              <a:tr h="228600">
                 <a:tc>
                   <a:txBody>
                     <a:bodyPr/>
@@ -3830,7 +3830,7 @@
                       </a:endParaRPr>
                     </a:p>
                   </a:txBody>
-                  <a:tcPr marL="2773" marR="2773" marT="2773" marB="0" anchor="ctr">
+                  <a:tcPr marL="3200" marR="3200" marT="3200" marB="0" anchor="ctr">
                     <a:solidFill>
                       <a:schemeClr val="accent5">
                         <a:lumMod val="20000"/>
@@ -3845,7 +3845,7 @@
                   </a:ext>
                 </a:extLst>
               </a:tr>
-              <a:tr h="224518">
+              <a:tr h="228600">
                 <a:tc>
                   <a:txBody>
                     <a:bodyPr/>
@@ -3877,7 +3877,7 @@
                       </a:endParaRPr>
                     </a:p>
                   </a:txBody>
-                  <a:tcPr marL="2773" marR="2773" marT="2773" marB="0" anchor="ctr"/>
+                  <a:tcPr marL="3200" marR="3200" marT="3200" marB="0" anchor="ctr"/>
                 </a:tc>
                 <a:extLst>
                   <a:ext uri="{0D108BD9-81ED-4DB2-BD59-A6C34878D82A}">
@@ -3885,7 +3885,7 @@
                   </a:ext>
                 </a:extLst>
               </a:tr>
-              <a:tr h="224518">
+              <a:tr h="228600">
                 <a:tc>
                   <a:txBody>
                     <a:bodyPr/>
@@ -3917,7 +3917,7 @@
                       </a:endParaRPr>
                     </a:p>
                   </a:txBody>
-                  <a:tcPr marL="2773" marR="2773" marT="2773" marB="0" anchor="ctr"/>
+                  <a:tcPr marL="3200" marR="3200" marT="3200" marB="0" anchor="ctr"/>
                 </a:tc>
                 <a:extLst>
                   <a:ext uri="{0D108BD9-81ED-4DB2-BD59-A6C34878D82A}">

</xml_diff>